<commit_message>
HTML - WEEK 2 DAY 3 - Video
</commit_message>
<xml_diff>
--- a/Presentations/HTML - WEEK 2 DAY 3 - Video.pptx
+++ b/Presentations/HTML - WEEK 2 DAY 3 - Video.pptx
@@ -220,7 +220,7 @@
             <a:fld id="{1D8BD707-D9CF-40AE-B4C6-C98DA3205C09}" type="datetimeFigureOut">
               <a:rPr lang="en-US" smtClean="0"/>
               <a:pPr/>
-              <a:t>24-Nov-22</a:t>
+              <a:t>16-May-23</a:t>
             </a:fld>
             <a:endParaRPr lang="en-US"/>
           </a:p>
@@ -448,7 +448,7 @@
             <a:fld id="{1D8BD707-D9CF-40AE-B4C6-C98DA3205C09}" type="datetimeFigureOut">
               <a:rPr lang="en-US" smtClean="0"/>
               <a:pPr/>
-              <a:t>24-Nov-22</a:t>
+              <a:t>16-May-23</a:t>
             </a:fld>
             <a:endParaRPr lang="en-US"/>
           </a:p>
@@ -625,7 +625,7 @@
             <a:fld id="{1D8BD707-D9CF-40AE-B4C6-C98DA3205C09}" type="datetimeFigureOut">
               <a:rPr lang="en-US" smtClean="0"/>
               <a:pPr/>
-              <a:t>24-Nov-22</a:t>
+              <a:t>16-May-23</a:t>
             </a:fld>
             <a:endParaRPr lang="en-US"/>
           </a:p>
@@ -792,7 +792,7 @@
             <a:fld id="{1D8BD707-D9CF-40AE-B4C6-C98DA3205C09}" type="datetimeFigureOut">
               <a:rPr lang="en-US" smtClean="0"/>
               <a:pPr/>
-              <a:t>24-Nov-22</a:t>
+              <a:t>16-May-23</a:t>
             </a:fld>
             <a:endParaRPr lang="en-US"/>
           </a:p>
@@ -1038,7 +1038,7 @@
             <a:fld id="{1D8BD707-D9CF-40AE-B4C6-C98DA3205C09}" type="datetimeFigureOut">
               <a:rPr lang="en-US" smtClean="0"/>
               <a:pPr/>
-              <a:t>24-Nov-22</a:t>
+              <a:t>16-May-23</a:t>
             </a:fld>
             <a:endParaRPr lang="en-US"/>
           </a:p>
@@ -1304,7 +1304,7 @@
             <a:fld id="{1D8BD707-D9CF-40AE-B4C6-C98DA3205C09}" type="datetimeFigureOut">
               <a:rPr lang="en-US" smtClean="0"/>
               <a:pPr/>
-              <a:t>24-Nov-22</a:t>
+              <a:t>16-May-23</a:t>
             </a:fld>
             <a:endParaRPr lang="en-US"/>
           </a:p>
@@ -1680,7 +1680,7 @@
             <a:fld id="{1D8BD707-D9CF-40AE-B4C6-C98DA3205C09}" type="datetimeFigureOut">
               <a:rPr lang="en-US" smtClean="0"/>
               <a:pPr/>
-              <a:t>24-Nov-22</a:t>
+              <a:t>16-May-23</a:t>
             </a:fld>
             <a:endParaRPr lang="en-US"/>
           </a:p>
@@ -1795,7 +1795,7 @@
             <a:fld id="{1D8BD707-D9CF-40AE-B4C6-C98DA3205C09}" type="datetimeFigureOut">
               <a:rPr lang="en-US" smtClean="0"/>
               <a:pPr/>
-              <a:t>24-Nov-22</a:t>
+              <a:t>16-May-23</a:t>
             </a:fld>
             <a:endParaRPr lang="en-US"/>
           </a:p>
@@ -1887,7 +1887,7 @@
             <a:fld id="{1D8BD707-D9CF-40AE-B4C6-C98DA3205C09}" type="datetimeFigureOut">
               <a:rPr lang="en-US" smtClean="0"/>
               <a:pPr/>
-              <a:t>24-Nov-22</a:t>
+              <a:t>16-May-23</a:t>
             </a:fld>
             <a:endParaRPr lang="en-US"/>
           </a:p>
@@ -2147,7 +2147,7 @@
             <a:fld id="{1D8BD707-D9CF-40AE-B4C6-C98DA3205C09}" type="datetimeFigureOut">
               <a:rPr lang="en-US" smtClean="0"/>
               <a:pPr/>
-              <a:t>24-Nov-22</a:t>
+              <a:t>16-May-23</a:t>
             </a:fld>
             <a:endParaRPr lang="en-US"/>
           </a:p>
@@ -2413,7 +2413,7 @@
             <a:fld id="{1D8BD707-D9CF-40AE-B4C6-C98DA3205C09}" type="datetimeFigureOut">
               <a:rPr lang="en-US" smtClean="0"/>
               <a:pPr/>
-              <a:t>24-Nov-22</a:t>
+              <a:t>16-May-23</a:t>
             </a:fld>
             <a:endParaRPr lang="en-US"/>
           </a:p>
@@ -2632,7 +2632,7 @@
             <a:fld id="{1D8BD707-D9CF-40AE-B4C6-C98DA3205C09}" type="datetimeFigureOut">
               <a:rPr lang="en-US" smtClean="0"/>
               <a:pPr/>
-              <a:t>24-Nov-22</a:t>
+              <a:t>16-May-23</a:t>
             </a:fld>
             <a:endParaRPr lang="en-US"/>
           </a:p>
@@ -3375,14 +3375,6 @@
               </a:rPr>
               <a:t>Muted</a:t>
             </a:r>
-            <a:endParaRPr lang="en-US" sz="2400" b="1" dirty="0" smtClean="0">
-              <a:solidFill>
-                <a:srgbClr val="002060"/>
-              </a:solidFill>
-              <a:latin typeface="Tahoma" pitchFamily="34" charset="0"/>
-              <a:ea typeface="Tahoma" pitchFamily="34" charset="0"/>
-              <a:cs typeface="Tahoma" pitchFamily="34" charset="0"/>
-            </a:endParaRPr>
           </a:p>
           <a:p>
             <a:pPr marL="342900" indent="-342900">
@@ -3461,14 +3453,6 @@
               </a:rPr>
               <a:t> are there}</a:t>
             </a:r>
-            <a:endParaRPr lang="en-US" sz="2400" b="1" dirty="0" smtClean="0">
-              <a:solidFill>
-                <a:srgbClr val="002060"/>
-              </a:solidFill>
-              <a:latin typeface="Tahoma" pitchFamily="34" charset="0"/>
-              <a:ea typeface="Tahoma" pitchFamily="34" charset="0"/>
-              <a:cs typeface="Tahoma" pitchFamily="34" charset="0"/>
-            </a:endParaRPr>
           </a:p>
           <a:p>
             <a:pPr marL="342900" indent="-342900">
@@ -3797,7 +3781,7 @@
               <a:buChar char="v"/>
             </a:pPr>
             <a:r>
-              <a:rPr lang="en-US" sz="2400" b="1">
+              <a:rPr lang="en-US" sz="2400" b="1" dirty="0">
                 <a:solidFill>
                   <a:srgbClr val="002060"/>
                 </a:solidFill>
@@ -3806,7 +3790,7 @@
               <a:t>Span </a:t>
             </a:r>
             <a:r>
-              <a:rPr lang="en-US" sz="2400" b="1" smtClean="0">
+              <a:rPr lang="en-US" sz="2400" b="1" dirty="0" smtClean="0">
                 <a:solidFill>
                   <a:srgbClr val="002060"/>
                 </a:solidFill>

</xml_diff>